<commit_message>
Minor change to poster.
</commit_message>
<xml_diff>
--- a/poster_MAX.pptx
+++ b/poster_MAX.pptx
@@ -5630,7 +5630,6 @@
               <a:rPr lang="en-US" dirty="0" smtClean="0"/>
               <a:t>obvious</a:t>
             </a:r>
-            <a:endParaRPr lang="en-US" dirty="0" smtClean="0"/>
           </a:p>
           <a:p>
             <a:pPr marL="457200" indent="-457200">
@@ -5649,11 +5648,7 @@
             </a:pPr>
             <a:r>
               <a:rPr lang="en-US" dirty="0" smtClean="0"/>
-              <a:t>Not all students see all skills, problem </a:t>
-            </a:r>
-            <a:r>
-              <a:rPr lang="en-US" dirty="0" smtClean="0"/>
-              <a:t>sets</a:t>
+              <a:t>Not all students see all skills, problem sets</a:t>
             </a:r>
           </a:p>
           <a:p>
@@ -5665,7 +5660,6 @@
               <a:rPr lang="en-US" dirty="0" smtClean="0"/>
               <a:t>Some values for a training set data point are missing, compromising their predictive value</a:t>
             </a:r>
-            <a:endParaRPr lang="en-US" dirty="0" smtClean="0"/>
           </a:p>
           <a:p>
             <a:pPr marL="457200" indent="-457200">
@@ -5674,11 +5668,7 @@
             </a:pPr>
             <a:r>
               <a:rPr lang="en-US" dirty="0" smtClean="0"/>
-              <a:t>New feature elements appear in test </a:t>
-            </a:r>
-            <a:r>
-              <a:rPr lang="en-US" dirty="0" smtClean="0"/>
-              <a:t>subsets – new students, new skills</a:t>
+              <a:t>New feature elements appear in test subsets – new students, new skills</a:t>
             </a:r>
           </a:p>
           <a:p>
@@ -5688,15 +5678,7 @@
             </a:pPr>
             <a:r>
               <a:rPr lang="en-US" dirty="0" smtClean="0"/>
-              <a:t>Data </a:t>
-            </a:r>
-            <a:r>
-              <a:rPr lang="en-US" dirty="0" smtClean="0"/>
-              <a:t>is a non-continuous time </a:t>
-            </a:r>
-            <a:r>
-              <a:rPr lang="en-US" dirty="0" smtClean="0"/>
-              <a:t>series</a:t>
+              <a:t>Data is a non-continuous time series</a:t>
             </a:r>
           </a:p>
           <a:p>
@@ -5708,7 +5690,6 @@
               <a:rPr lang="en-US" dirty="0" smtClean="0"/>
               <a:t>At the moment, we are ignoring this due to the sparsity of the data</a:t>
             </a:r>
-            <a:endParaRPr lang="en-US" dirty="0" smtClean="0"/>
           </a:p>
         </p:txBody>
       </p:sp>
@@ -5910,11 +5891,7 @@
             </a:r>
             <a:r>
               <a:rPr lang="en-US" sz="3600" dirty="0" smtClean="0"/>
-              <a:t>of the 19 </a:t>
-            </a:r>
-            <a:r>
-              <a:rPr lang="en-US" sz="3600" dirty="0" smtClean="0"/>
-              <a:t>variables</a:t>
+              <a:t>of the 19 variables</a:t>
             </a:r>
           </a:p>
           <a:p>
@@ -7574,31 +7551,7 @@
               <a:rPr lang="en-US" sz="3599" dirty="0" smtClean="0">
                 <a:latin typeface="+mj-lt"/>
               </a:rPr>
-              <a:t>The duration of time a student spends on a particular problem and the number of times a student encounters a given skill seem to be good predictors of the ability of a student to answer correctly, as the former </a:t>
-            </a:r>
-            <a:r>
-              <a:rPr lang="en-US" sz="3599" dirty="0" smtClean="0">
-                <a:latin typeface="+mj-lt"/>
-              </a:rPr>
-              <a:t>provides strong information gains</a:t>
-            </a:r>
-            <a:r>
-              <a:rPr lang="en-US" sz="3599" dirty="0" smtClean="0">
-                <a:latin typeface="+mj-lt"/>
-              </a:rPr>
-              <a:t>, </a:t>
-            </a:r>
-            <a:r>
-              <a:rPr lang="en-US" sz="3599" dirty="0" smtClean="0">
-                <a:latin typeface="+mj-lt"/>
-              </a:rPr>
-              <a:t>while the latter correlates well with student performance. Since we are not given the step duration in the test set, we use our HMM to predict this</a:t>
-            </a:r>
-            <a:r>
-              <a:rPr lang="en-US" sz="3599" dirty="0" smtClean="0">
-                <a:latin typeface="+mj-lt"/>
-              </a:rPr>
-              <a:t>.</a:t>
+              <a:t>The duration of time a student spends on a particular problem and the number of times a student encounters a given skill seem to be good predictors of the ability of a student to answer correctly, as the former provides strong information gains, while the latter correlates well with student performance. Since we are not given the step duration in the test set, we use our HMM to predict this.</a:t>
             </a:r>
             <a:endParaRPr lang="en-US" sz="3599" dirty="0">
               <a:latin typeface="+mj-lt"/>
@@ -7626,9 +7579,6 @@
               </a:rPr>
               <a:t>In conjunction, a decision tree is built from the training dataset using these two variables to predict “Correct First Attempt”. The generated probabilities from the HMM were used to predict likely states in the test set, and a decision tree was then used to predict the probability of a correct first attempt in the test set.</a:t>
             </a:r>
-            <a:endParaRPr lang="en-US" sz="3599" dirty="0" smtClean="0">
-              <a:latin typeface="+mj-lt"/>
-            </a:endParaRPr>
           </a:p>
         </p:txBody>
       </p:sp>
@@ -7980,7 +7930,19 @@
               <a:rPr lang="en-US" sz="3599" dirty="0" smtClean="0">
                 <a:latin typeface="+mj-lt"/>
               </a:rPr>
-              <a:t>The third state (our nominal comprehension state) is not likely until very late in the time series, indicated possible redundancy. The generated posterior probabilities are then used with the emission probabilities predicted above for the binned step duration to generate a weighted expected step duration. This expected step duration, along with the opportunity given in the test set, are then plugged into a decision tree to generate a probability of “Correct First Set” for a given data point. Currently, this predicted </a:t>
+              <a:t>The third state (our nominal comprehension state) is not likely until very late in the time series, indicated possible redundancy. The generated posterior probabilities are then used with the emission probabilities predicted above for the binned step duration to generate a weighted expected step duration. This expected step duration, along with the opportunity given in the test set, are then plugged into a decision tree to generate a probability of “Correct First </a:t>
+            </a:r>
+            <a:r>
+              <a:rPr lang="en-US" sz="3599" dirty="0" smtClean="0">
+                <a:latin typeface="+mj-lt"/>
+              </a:rPr>
+              <a:t>Attempt” </a:t>
+            </a:r>
+            <a:r>
+              <a:rPr lang="en-US" sz="3599" dirty="0" smtClean="0">
+                <a:latin typeface="+mj-lt"/>
+              </a:rPr>
+              <a:t>for a given data point. Currently, this predicted </a:t>
             </a:r>
             <a:r>
               <a:rPr lang="en-US" sz="3599" dirty="0" err="1" smtClean="0">
@@ -7998,17 +7960,20 @@
               <a:rPr lang="en-US" sz="3599" dirty="0" smtClean="0">
                 <a:latin typeface="+mj-lt"/>
               </a:rPr>
-              <a:t> is biased towards a positive prediction (as is the underlying data set), but currently </a:t>
+              <a:t> is biased towards a positive prediction (as is the underlying data set), but currently give a </a:t>
+            </a:r>
+            <a:r>
+              <a:rPr lang="en-US" sz="3599" b="1" dirty="0" smtClean="0">
+                <a:latin typeface="+mj-lt"/>
+              </a:rPr>
+              <a:t>16.5% </a:t>
             </a:r>
             <a:r>
               <a:rPr lang="en-US" sz="3599" dirty="0" smtClean="0">
                 <a:latin typeface="+mj-lt"/>
               </a:rPr>
-              <a:t>give a 16.5% error on the test set. More features must be generated to further improve this error.</a:t>
-            </a:r>
-            <a:endParaRPr lang="en-US" sz="3599" dirty="0" smtClean="0">
-              <a:latin typeface="+mj-lt"/>
-            </a:endParaRPr>
+              <a:t>error on the test set. More features must be generated to further improve this error.</a:t>
+            </a:r>
           </a:p>
           <a:p>
             <a:pPr eaLnBrk="1" hangingPunct="1">
@@ -8992,9 +8957,6 @@
               </a:rPr>
               <a:t>Transmission</a:t>
             </a:r>
-            <a:endParaRPr lang="en-US" sz="3599" dirty="0" smtClean="0">
-              <a:latin typeface="+mj-lt"/>
-            </a:endParaRPr>
           </a:p>
         </p:txBody>
       </p:sp>
@@ -9162,9 +9124,6 @@
               </a:rPr>
               <a:t>Emission</a:t>
             </a:r>
-            <a:endParaRPr lang="en-US" sz="3599" dirty="0" smtClean="0">
-              <a:latin typeface="+mj-lt"/>
-            </a:endParaRPr>
           </a:p>
         </p:txBody>
       </p:sp>

</xml_diff>